<commit_message>
Wrote 6.4 (example of change recommendation)
</commit_message>
<xml_diff>
--- a/paper/resource/mylyn_interaction.pptx
+++ b/paper/resource/mylyn_interaction.pptx
@@ -285,7 +285,7 @@
           <a:lstStyle/>
           <a:p>
             <a:fld id="{36740ABF-7E92-674C-96AC-CF6271EDDBFC}" type="datetimeFigureOut">
-              <a:t>15/06/08</a:t>
+              <a:t>16/01/20</a:t>
             </a:fld>
             <a:endParaRPr kumimoji="1" lang="ja-JP" altLang="en-US"/>
           </a:p>
@@ -483,7 +483,7 @@
           <a:lstStyle/>
           <a:p>
             <a:fld id="{36740ABF-7E92-674C-96AC-CF6271EDDBFC}" type="datetimeFigureOut">
-              <a:t>15/06/08</a:t>
+              <a:t>16/01/20</a:t>
             </a:fld>
             <a:endParaRPr kumimoji="1" lang="ja-JP" altLang="en-US"/>
           </a:p>
@@ -691,7 +691,7 @@
           <a:lstStyle/>
           <a:p>
             <a:fld id="{36740ABF-7E92-674C-96AC-CF6271EDDBFC}" type="datetimeFigureOut">
-              <a:t>15/06/08</a:t>
+              <a:t>16/01/20</a:t>
             </a:fld>
             <a:endParaRPr kumimoji="1" lang="ja-JP" altLang="en-US"/>
           </a:p>
@@ -889,7 +889,7 @@
           <a:lstStyle/>
           <a:p>
             <a:fld id="{36740ABF-7E92-674C-96AC-CF6271EDDBFC}" type="datetimeFigureOut">
-              <a:t>15/06/08</a:t>
+              <a:t>16/01/20</a:t>
             </a:fld>
             <a:endParaRPr kumimoji="1" lang="ja-JP" altLang="en-US"/>
           </a:p>
@@ -1132,7 +1132,7 @@
           <a:lstStyle/>
           <a:p>
             <a:fld id="{36740ABF-7E92-674C-96AC-CF6271EDDBFC}" type="datetimeFigureOut">
-              <a:t>15/06/08</a:t>
+              <a:t>16/01/20</a:t>
             </a:fld>
             <a:endParaRPr kumimoji="1" lang="ja-JP" altLang="en-US"/>
           </a:p>
@@ -1479,7 +1479,7 @@
           <a:lstStyle/>
           <a:p>
             <a:fld id="{36740ABF-7E92-674C-96AC-CF6271EDDBFC}" type="datetimeFigureOut">
-              <a:t>15/06/08</a:t>
+              <a:t>16/01/20</a:t>
             </a:fld>
             <a:endParaRPr kumimoji="1" lang="ja-JP" altLang="en-US"/>
           </a:p>
@@ -1960,7 +1960,7 @@
           <a:lstStyle/>
           <a:p>
             <a:fld id="{36740ABF-7E92-674C-96AC-CF6271EDDBFC}" type="datetimeFigureOut">
-              <a:t>15/06/08</a:t>
+              <a:t>16/01/20</a:t>
             </a:fld>
             <a:endParaRPr kumimoji="1" lang="ja-JP" altLang="en-US"/>
           </a:p>
@@ -2075,7 +2075,7 @@
           <a:lstStyle/>
           <a:p>
             <a:fld id="{36740ABF-7E92-674C-96AC-CF6271EDDBFC}" type="datetimeFigureOut">
-              <a:t>15/06/08</a:t>
+              <a:t>16/01/20</a:t>
             </a:fld>
             <a:endParaRPr kumimoji="1" lang="ja-JP" altLang="en-US"/>
           </a:p>
@@ -2168,7 +2168,7 @@
           <a:lstStyle/>
           <a:p>
             <a:fld id="{36740ABF-7E92-674C-96AC-CF6271EDDBFC}" type="datetimeFigureOut">
-              <a:t>15/06/08</a:t>
+              <a:t>16/01/20</a:t>
             </a:fld>
             <a:endParaRPr kumimoji="1" lang="ja-JP" altLang="en-US"/>
           </a:p>
@@ -2473,7 +2473,7 @@
           <a:lstStyle/>
           <a:p>
             <a:fld id="{36740ABF-7E92-674C-96AC-CF6271EDDBFC}" type="datetimeFigureOut">
-              <a:t>15/06/08</a:t>
+              <a:t>16/01/20</a:t>
             </a:fld>
             <a:endParaRPr kumimoji="1" lang="ja-JP" altLang="en-US"/>
           </a:p>
@@ -2723,7 +2723,7 @@
           <a:lstStyle/>
           <a:p>
             <a:fld id="{36740ABF-7E92-674C-96AC-CF6271EDDBFC}" type="datetimeFigureOut">
-              <a:t>15/06/08</a:t>
+              <a:t>16/01/20</a:t>
             </a:fld>
             <a:endParaRPr kumimoji="1" lang="ja-JP" altLang="en-US"/>
           </a:p>
@@ -2964,7 +2964,7 @@
           </a:lstStyle>
           <a:p>
             <a:fld id="{36740ABF-7E92-674C-96AC-CF6271EDDBFC}" type="datetimeFigureOut">
-              <a:t>15/06/08</a:t>
+              <a:t>16/01/20</a:t>
             </a:fld>
             <a:endParaRPr kumimoji="1" lang="ja-JP" altLang="en-US"/>
           </a:p>
@@ -3352,6 +3352,13 @@
           <a:prstGeom prst="ellipse">
             <a:avLst/>
           </a:prstGeom>
+          <a:solidFill>
+            <a:schemeClr val="tx2">
+              <a:lumMod val="20000"/>
+              <a:lumOff val="80000"/>
+            </a:schemeClr>
+          </a:solidFill>
+          <a:effectLst/>
         </p:spPr>
         <p:style>
           <a:lnRef idx="1">
@@ -3394,6 +3401,13 @@
           <a:prstGeom prst="triangle">
             <a:avLst/>
           </a:prstGeom>
+          <a:solidFill>
+            <a:schemeClr val="tx2">
+              <a:lumMod val="20000"/>
+              <a:lumOff val="80000"/>
+            </a:schemeClr>
+          </a:solidFill>
+          <a:effectLst/>
         </p:spPr>
         <p:style>
           <a:lnRef idx="1">
@@ -3614,6 +3628,13 @@
           <a:prstGeom prst="ellipse">
             <a:avLst/>
           </a:prstGeom>
+          <a:solidFill>
+            <a:schemeClr val="tx2">
+              <a:lumMod val="20000"/>
+              <a:lumOff val="80000"/>
+            </a:schemeClr>
+          </a:solidFill>
+          <a:effectLst/>
         </p:spPr>
         <p:style>
           <a:lnRef idx="1">
@@ -3656,6 +3677,13 @@
           <a:prstGeom prst="triangle">
             <a:avLst/>
           </a:prstGeom>
+          <a:solidFill>
+            <a:schemeClr val="tx2">
+              <a:lumMod val="20000"/>
+              <a:lumOff val="80000"/>
+            </a:schemeClr>
+          </a:solidFill>
+          <a:effectLst/>
         </p:spPr>
         <p:style>
           <a:lnRef idx="1">
@@ -3781,6 +3809,13 @@
           <a:prstGeom prst="rect">
             <a:avLst/>
           </a:prstGeom>
+          <a:solidFill>
+            <a:schemeClr val="tx2">
+              <a:lumMod val="20000"/>
+              <a:lumOff val="80000"/>
+            </a:schemeClr>
+          </a:solidFill>
+          <a:effectLst/>
         </p:spPr>
         <p:style>
           <a:lnRef idx="1">
@@ -3803,7 +3838,7 @@
             <a:pPr algn="ctr"/>
             <a:r>
               <a:rPr kumimoji="1" lang="en-US" altLang="ja-JP" dirty="0" smtClean="0"/>
-              <a:t>edit A</a:t>
+              <a:t>edit event A</a:t>
             </a:r>
             <a:r>
               <a:rPr kumimoji="1" lang="ja-JP" altLang="en-US" dirty="0" smtClean="0"/>
@@ -3811,7 +3846,7 @@
             </a:r>
             <a:r>
               <a:rPr kumimoji="1" lang="en-US" altLang="ja-JP" sz="1400" dirty="0" smtClean="0"/>
-              <a:t>(3 times)</a:t>
+              <a:t>(NumEvent=3)</a:t>
             </a:r>
             <a:endParaRPr kumimoji="1" lang="ja-JP" altLang="en-US" sz="1400" dirty="0"/>
           </a:p>
@@ -3825,12 +3860,19 @@
         </p:nvSpPr>
         <p:spPr>
           <a:xfrm>
-            <a:off x="5700890" y="4459739"/>
-            <a:ext cx="1003653" cy="254114"/>
+            <a:off x="5557440" y="4438489"/>
+            <a:ext cx="1318816" cy="430671"/>
           </a:xfrm>
           <a:prstGeom prst="rect">
             <a:avLst/>
           </a:prstGeom>
+          <a:solidFill>
+            <a:schemeClr val="tx2">
+              <a:lumMod val="20000"/>
+              <a:lumOff val="80000"/>
+            </a:schemeClr>
+          </a:solidFill>
+          <a:effectLst/>
         </p:spPr>
         <p:style>
           <a:lnRef idx="1">
@@ -3852,10 +3894,17 @@
           <a:p>
             <a:pPr algn="ctr"/>
             <a:r>
-              <a:rPr kumimoji="1" lang="en-US" altLang="ja-JP" dirty="0" smtClean="0"/>
-              <a:t>edit B</a:t>
-            </a:r>
-            <a:endParaRPr kumimoji="1" lang="ja-JP" altLang="en-US" dirty="0"/>
+              <a:rPr kumimoji="1" lang="en-US" altLang="ja-JP" sz="1400" dirty="0" smtClean="0"/>
+              <a:t>edit event B</a:t>
+            </a:r>
+          </a:p>
+          <a:p>
+            <a:pPr algn="ctr"/>
+            <a:r>
+              <a:rPr lang="en-US" altLang="ja-JP" sz="1400" dirty="0"/>
+              <a:t>(NumEvent=1)</a:t>
+            </a:r>
+            <a:endParaRPr kumimoji="1" lang="ja-JP" altLang="en-US" sz="1400" dirty="0"/>
           </a:p>
         </p:txBody>
       </p:sp>
@@ -3867,12 +3916,19 @@
         </p:nvSpPr>
         <p:spPr>
           <a:xfrm>
-            <a:off x="3987440" y="4816668"/>
+            <a:off x="3987440" y="4967568"/>
             <a:ext cx="3193329" cy="312090"/>
           </a:xfrm>
           <a:prstGeom prst="rect">
             <a:avLst/>
           </a:prstGeom>
+          <a:solidFill>
+            <a:schemeClr val="tx2">
+              <a:lumMod val="20000"/>
+              <a:lumOff val="80000"/>
+            </a:schemeClr>
+          </a:solidFill>
+          <a:effectLst/>
         </p:spPr>
         <p:style>
           <a:lnRef idx="1">
@@ -3899,7 +3955,15 @@
             </a:r>
             <a:r>
               <a:rPr kumimoji="1" lang="en-US" altLang="ja-JP" sz="1600" dirty="0"/>
-              <a:t>(2 times)</a:t>
+              <a:t>(</a:t>
+            </a:r>
+            <a:r>
+              <a:rPr lang="en-US" altLang="ja-JP" sz="1600" dirty="0"/>
+              <a:t>NumEvent=</a:t>
+            </a:r>
+            <a:r>
+              <a:rPr kumimoji="1" lang="en-US" altLang="ja-JP" sz="1600" dirty="0"/>
+              <a:t>2)</a:t>
             </a:r>
             <a:endParaRPr kumimoji="1" lang="ja-JP" altLang="en-US" sz="2400" dirty="0"/>
           </a:p>
@@ -3913,7 +3977,7 @@
         </p:nvCxnSpPr>
         <p:spPr>
           <a:xfrm flipV="1">
-            <a:off x="2689511" y="5259274"/>
+            <a:off x="2689511" y="5410174"/>
             <a:ext cx="5614862" cy="18674"/>
           </a:xfrm>
           <a:prstGeom prst="straightConnector1">
@@ -3952,6 +4016,13 @@
           <a:prstGeom prst="triangle">
             <a:avLst/>
           </a:prstGeom>
+          <a:solidFill>
+            <a:schemeClr val="tx2">
+              <a:lumMod val="20000"/>
+              <a:lumOff val="80000"/>
+            </a:schemeClr>
+          </a:solidFill>
+          <a:effectLst/>
         </p:spPr>
         <p:style>
           <a:lnRef idx="1">
@@ -4001,6 +4072,13 @@
           <a:prstGeom prst="ellipse">
             <a:avLst/>
           </a:prstGeom>
+          <a:solidFill>
+            <a:schemeClr val="tx2">
+              <a:lumMod val="20000"/>
+              <a:lumOff val="80000"/>
+            </a:schemeClr>
+          </a:solidFill>
+          <a:effectLst/>
         </p:spPr>
         <p:style>
           <a:lnRef idx="1">
@@ -4111,6 +4189,13 @@
           <a:prstGeom prst="ellipse">
             <a:avLst/>
           </a:prstGeom>
+          <a:solidFill>
+            <a:schemeClr val="tx2">
+              <a:lumMod val="20000"/>
+              <a:lumOff val="80000"/>
+            </a:schemeClr>
+          </a:solidFill>
+          <a:effectLst/>
         </p:spPr>
         <p:style>
           <a:lnRef idx="1">
@@ -4153,6 +4238,13 @@
           <a:prstGeom prst="triangle">
             <a:avLst/>
           </a:prstGeom>
+          <a:solidFill>
+            <a:schemeClr val="tx2">
+              <a:lumMod val="20000"/>
+              <a:lumOff val="80000"/>
+            </a:schemeClr>
+          </a:solidFill>
+          <a:effectLst/>
         </p:spPr>
         <p:style>
           <a:lnRef idx="1">
@@ -4268,7 +4360,7 @@
         </p:nvSpPr>
         <p:spPr>
           <a:xfrm>
-            <a:off x="7669405" y="5312223"/>
+            <a:off x="7669405" y="5463123"/>
             <a:ext cx="612517" cy="369332"/>
           </a:xfrm>
           <a:prstGeom prst="rect">

</xml_diff>